<commit_message>
Test Release Uitwisseling GEMMA
</commit_message>
<xml_diff>
--- a/tools/docs/Uitwisseling_GGM_en_GEMMA.pptx
+++ b/tools/docs/Uitwisseling_GGM_en_GEMMA.pptx
@@ -264,7 +264,7 @@
           <a:p>
             <a:fld id="{CD8A7682-E852-8D40-AC40-C0AC29650288}" type="datetimeFigureOut">
               <a:rPr lang="nl-NL" smtClean="0"/>
-              <a:t>29-03-2023</a:t>
+              <a:t>07-06-2023</a:t>
             </a:fld>
             <a:endParaRPr lang="nl-NL"/>
           </a:p>
@@ -462,7 +462,7 @@
           <a:p>
             <a:fld id="{CD8A7682-E852-8D40-AC40-C0AC29650288}" type="datetimeFigureOut">
               <a:rPr lang="nl-NL" smtClean="0"/>
-              <a:t>29-03-2023</a:t>
+              <a:t>07-06-2023</a:t>
             </a:fld>
             <a:endParaRPr lang="nl-NL"/>
           </a:p>
@@ -670,7 +670,7 @@
           <a:p>
             <a:fld id="{CD8A7682-E852-8D40-AC40-C0AC29650288}" type="datetimeFigureOut">
               <a:rPr lang="nl-NL" smtClean="0"/>
-              <a:t>29-03-2023</a:t>
+              <a:t>07-06-2023</a:t>
             </a:fld>
             <a:endParaRPr lang="nl-NL"/>
           </a:p>
@@ -868,7 +868,7 @@
           <a:p>
             <a:fld id="{CD8A7682-E852-8D40-AC40-C0AC29650288}" type="datetimeFigureOut">
               <a:rPr lang="nl-NL" smtClean="0"/>
-              <a:t>29-03-2023</a:t>
+              <a:t>07-06-2023</a:t>
             </a:fld>
             <a:endParaRPr lang="nl-NL"/>
           </a:p>
@@ -1143,7 +1143,7 @@
           <a:p>
             <a:fld id="{CD8A7682-E852-8D40-AC40-C0AC29650288}" type="datetimeFigureOut">
               <a:rPr lang="nl-NL" smtClean="0"/>
-              <a:t>29-03-2023</a:t>
+              <a:t>07-06-2023</a:t>
             </a:fld>
             <a:endParaRPr lang="nl-NL"/>
           </a:p>
@@ -1408,7 +1408,7 @@
           <a:p>
             <a:fld id="{CD8A7682-E852-8D40-AC40-C0AC29650288}" type="datetimeFigureOut">
               <a:rPr lang="nl-NL" smtClean="0"/>
-              <a:t>29-03-2023</a:t>
+              <a:t>07-06-2023</a:t>
             </a:fld>
             <a:endParaRPr lang="nl-NL"/>
           </a:p>
@@ -1820,7 +1820,7 @@
           <a:p>
             <a:fld id="{CD8A7682-E852-8D40-AC40-C0AC29650288}" type="datetimeFigureOut">
               <a:rPr lang="nl-NL" smtClean="0"/>
-              <a:t>29-03-2023</a:t>
+              <a:t>07-06-2023</a:t>
             </a:fld>
             <a:endParaRPr lang="nl-NL"/>
           </a:p>
@@ -1961,7 +1961,7 @@
           <a:p>
             <a:fld id="{CD8A7682-E852-8D40-AC40-C0AC29650288}" type="datetimeFigureOut">
               <a:rPr lang="nl-NL" smtClean="0"/>
-              <a:t>29-03-2023</a:t>
+              <a:t>07-06-2023</a:t>
             </a:fld>
             <a:endParaRPr lang="nl-NL"/>
           </a:p>
@@ -2074,7 +2074,7 @@
           <a:p>
             <a:fld id="{CD8A7682-E852-8D40-AC40-C0AC29650288}" type="datetimeFigureOut">
               <a:rPr lang="nl-NL" smtClean="0"/>
-              <a:t>29-03-2023</a:t>
+              <a:t>07-06-2023</a:t>
             </a:fld>
             <a:endParaRPr lang="nl-NL"/>
           </a:p>
@@ -2385,7 +2385,7 @@
           <a:p>
             <a:fld id="{CD8A7682-E852-8D40-AC40-C0AC29650288}" type="datetimeFigureOut">
               <a:rPr lang="nl-NL" smtClean="0"/>
-              <a:t>29-03-2023</a:t>
+              <a:t>07-06-2023</a:t>
             </a:fld>
             <a:endParaRPr lang="nl-NL"/>
           </a:p>
@@ -2673,7 +2673,7 @@
           <a:p>
             <a:fld id="{CD8A7682-E852-8D40-AC40-C0AC29650288}" type="datetimeFigureOut">
               <a:rPr lang="nl-NL" smtClean="0"/>
-              <a:t>29-03-2023</a:t>
+              <a:t>07-06-2023</a:t>
             </a:fld>
             <a:endParaRPr lang="nl-NL"/>
           </a:p>
@@ -2914,7 +2914,7 @@
           <a:p>
             <a:fld id="{CD8A7682-E852-8D40-AC40-C0AC29650288}" type="datetimeFigureOut">
               <a:rPr lang="nl-NL" smtClean="0"/>
-              <a:t>29-03-2023</a:t>
+              <a:t>07-06-2023</a:t>
             </a:fld>
             <a:endParaRPr lang="nl-NL"/>
           </a:p>
@@ -4172,7 +4172,7 @@
           <a:p>
             <a:r>
               <a:rPr lang="nl-NL" dirty="0"/>
-              <a:t>Elementen/Objecttypen en Eigenschappen/Attribuutsoorten</a:t>
+              <a:t>Elementen/Objecttypen</a:t>
             </a:r>
           </a:p>
           <a:p>
@@ -4375,7 +4375,7 @@
           <a:p>
             <a:r>
               <a:rPr lang="nl-NL" dirty="0"/>
-              <a:t>CSV structuur (elementen / eigenschappen)</a:t>
+              <a:t>CSV structuur Elementen</a:t>
             </a:r>
           </a:p>
         </p:txBody>
@@ -4399,61 +4399,121 @@
         <p:spPr/>
         <p:txBody>
           <a:bodyPr>
-            <a:normAutofit fontScale="77500" lnSpcReduction="20000"/>
+            <a:normAutofit fontScale="55000" lnSpcReduction="20000"/>
           </a:bodyPr>
           <a:lstStyle/>
           <a:p>
-            <a:r>
-              <a:rPr lang="nl-NL" dirty="0"/>
-              <a:t>Naam (label)</a:t>
-            </a:r>
-          </a:p>
-          <a:p>
-            <a:r>
-              <a:rPr lang="nl-NL" dirty="0"/>
-              <a:t>Definitie</a:t>
-            </a:r>
-          </a:p>
-          <a:p>
-            <a:r>
-              <a:rPr lang="nl-NL" dirty="0"/>
-              <a:t>ArchiMate-type (business-object/data-object)</a:t>
-            </a:r>
-          </a:p>
-          <a:p>
-            <a:r>
-              <a:rPr lang="nl-NL" dirty="0"/>
-              <a:t>UML-type </a:t>
-            </a:r>
-          </a:p>
-          <a:p>
-            <a:r>
-              <a:rPr lang="nl-NL" dirty="0"/>
-              <a:t>GEMMA GUID</a:t>
-            </a:r>
-          </a:p>
-          <a:p>
-            <a:r>
-              <a:rPr lang="nl-NL" dirty="0"/>
-              <a:t>GGM GUID</a:t>
-            </a:r>
-          </a:p>
-          <a:p>
-            <a:r>
-              <a:rPr lang="nl-NL" dirty="0"/>
-              <a:t>Bron</a:t>
-            </a:r>
-          </a:p>
-          <a:p>
-            <a:r>
-              <a:rPr lang="nl-NL" dirty="0"/>
-              <a:t>Toelichting</a:t>
-            </a:r>
-          </a:p>
-          <a:p>
-            <a:r>
-              <a:rPr lang="nl-NL" dirty="0"/>
-              <a:t>Synoniem (</a:t>
+            <a:pPr marL="514350" indent="-514350">
+              <a:buFont typeface="+mj-lt"/>
+              <a:buAutoNum type="arabicPeriod"/>
+            </a:pPr>
+            <a:r>
+              <a:rPr lang="nl-NL" dirty="0" err="1"/>
+              <a:t>nr</a:t>
+            </a:r>
+            <a:r>
+              <a:rPr lang="nl-NL" dirty="0"/>
+              <a:t> (technisch nummer, nodig voor de uitwisseling, wordt niet opgenomen in de modellen)</a:t>
+            </a:r>
+          </a:p>
+          <a:p>
+            <a:pPr marL="514350" indent="-514350">
+              <a:buFont typeface="+mj-lt"/>
+              <a:buAutoNum type="arabicPeriod"/>
+            </a:pPr>
+            <a:r>
+              <a:rPr lang="nl-NL" dirty="0"/>
+              <a:t>naam (label)</a:t>
+            </a:r>
+          </a:p>
+          <a:p>
+            <a:pPr marL="514350" indent="-514350">
+              <a:buFont typeface="+mj-lt"/>
+              <a:buAutoNum type="arabicPeriod"/>
+            </a:pPr>
+            <a:r>
+              <a:rPr lang="nl-NL" dirty="0"/>
+              <a:t>definitie</a:t>
+            </a:r>
+          </a:p>
+          <a:p>
+            <a:pPr marL="514350" indent="-514350">
+              <a:buFont typeface="+mj-lt"/>
+              <a:buAutoNum type="arabicPeriod"/>
+            </a:pPr>
+            <a:r>
+              <a:rPr lang="nl-NL" dirty="0" err="1"/>
+              <a:t>archimate</a:t>
+            </a:r>
+            <a:r>
+              <a:rPr lang="nl-NL" dirty="0"/>
+              <a:t>-type (business-object/data-object)</a:t>
+            </a:r>
+          </a:p>
+          <a:p>
+            <a:pPr marL="514350" indent="-514350">
+              <a:buFont typeface="+mj-lt"/>
+              <a:buAutoNum type="arabicPeriod"/>
+            </a:pPr>
+            <a:r>
+              <a:rPr lang="nl-NL" dirty="0" err="1"/>
+              <a:t>uml</a:t>
+            </a:r>
+            <a:r>
+              <a:rPr lang="nl-NL" dirty="0"/>
+              <a:t>-type </a:t>
+            </a:r>
+          </a:p>
+          <a:p>
+            <a:pPr marL="514350" indent="-514350">
+              <a:buFont typeface="+mj-lt"/>
+              <a:buAutoNum type="arabicPeriod"/>
+            </a:pPr>
+            <a:r>
+              <a:rPr lang="nl-NL" dirty="0" err="1"/>
+              <a:t>gemma-guid</a:t>
+            </a:r>
+            <a:endParaRPr lang="nl-NL" dirty="0"/>
+          </a:p>
+          <a:p>
+            <a:pPr marL="514350" indent="-514350">
+              <a:buFont typeface="+mj-lt"/>
+              <a:buAutoNum type="arabicPeriod"/>
+            </a:pPr>
+            <a:r>
+              <a:rPr lang="nl-NL" dirty="0" err="1"/>
+              <a:t>ggm-guid</a:t>
+            </a:r>
+            <a:endParaRPr lang="nl-NL" dirty="0"/>
+          </a:p>
+          <a:p>
+            <a:pPr marL="514350" indent="-514350">
+              <a:buFont typeface="+mj-lt"/>
+              <a:buAutoNum type="arabicPeriod"/>
+            </a:pPr>
+            <a:r>
+              <a:rPr lang="nl-NL" dirty="0"/>
+              <a:t>bron</a:t>
+            </a:r>
+          </a:p>
+          <a:p>
+            <a:pPr marL="514350" indent="-514350">
+              <a:buFont typeface="+mj-lt"/>
+              <a:buAutoNum type="arabicPeriod"/>
+            </a:pPr>
+            <a:r>
+              <a:rPr lang="nl-NL" dirty="0"/>
+              <a:t>toelichting</a:t>
+            </a:r>
+          </a:p>
+          <a:p>
+            <a:pPr marL="514350" indent="-514350">
+              <a:buFont typeface="+mj-lt"/>
+              <a:buAutoNum type="arabicPeriod"/>
+            </a:pPr>
+            <a:r>
+              <a:rPr lang="nl-NL" dirty="0"/>
+              <a:t>synoniemen (</a:t>
             </a:r>
             <a:r>
               <a:rPr lang="nl-NL" dirty="0" err="1"/>
@@ -4473,13 +4533,17 @@
             </a:r>
           </a:p>
           <a:p>
-            <a:r>
-              <a:rPr lang="nl-NL" dirty="0"/>
-              <a:t>Domein Iv3</a:t>
+            <a:pPr marL="514350" indent="-514350">
+              <a:buFont typeface="+mj-lt"/>
+              <a:buAutoNum type="arabicPeriod"/>
+            </a:pPr>
+            <a:r>
+              <a:rPr lang="nl-NL" dirty="0"/>
+              <a:t>domein-iv3</a:t>
             </a:r>
             <a:r>
               <a:rPr lang="nl-NL" baseline="30000" dirty="0"/>
-              <a:t>plus </a:t>
+              <a:t> </a:t>
             </a:r>
             <a:r>
               <a:rPr lang="nl-NL" dirty="0"/>
@@ -4487,15 +4551,51 @@
             </a:r>
           </a:p>
           <a:p>
-            <a:r>
-              <a:rPr lang="nl-NL" dirty="0"/>
-              <a:t>Domein DCAT</a:t>
-            </a:r>
-          </a:p>
-          <a:p>
-            <a:r>
-              <a:rPr lang="nl-NL" dirty="0"/>
-              <a:t>Domein GEMMA</a:t>
+            <a:pPr marL="514350" indent="-514350">
+              <a:buFont typeface="+mj-lt"/>
+              <a:buAutoNum type="arabicPeriod"/>
+            </a:pPr>
+            <a:r>
+              <a:rPr lang="nl-NL" dirty="0"/>
+              <a:t>domein-</a:t>
+            </a:r>
+            <a:r>
+              <a:rPr lang="nl-NL" dirty="0" err="1"/>
+              <a:t>dcat</a:t>
+            </a:r>
+            <a:endParaRPr lang="nl-NL" dirty="0"/>
+          </a:p>
+          <a:p>
+            <a:pPr marL="514350" indent="-514350">
+              <a:buFont typeface="+mj-lt"/>
+              <a:buAutoNum type="arabicPeriod"/>
+            </a:pPr>
+            <a:r>
+              <a:rPr lang="nl-NL" dirty="0"/>
+              <a:t>domein-</a:t>
+            </a:r>
+            <a:r>
+              <a:rPr lang="nl-NL" dirty="0" err="1"/>
+              <a:t>gemma</a:t>
+            </a:r>
+            <a:endParaRPr lang="nl-NL" dirty="0"/>
+          </a:p>
+          <a:p>
+            <a:pPr marL="514350" indent="-514350">
+              <a:buFont typeface="+mj-lt"/>
+              <a:buAutoNum type="arabicPeriod"/>
+            </a:pPr>
+            <a:r>
+              <a:rPr lang="nl-NL" dirty="0"/>
+              <a:t>datum-tijd-export (</a:t>
+            </a:r>
+            <a:r>
+              <a:rPr lang="nl-NL" dirty="0" err="1"/>
+              <a:t>ddmmyyyy-hh:mm:ss</a:t>
+            </a:r>
+            <a:r>
+              <a:rPr lang="nl-NL" dirty="0"/>
+              <a:t>)</a:t>
             </a:r>
           </a:p>
         </p:txBody>
@@ -4577,77 +4677,185 @@
         <p:spPr/>
         <p:txBody>
           <a:bodyPr>
-            <a:normAutofit fontScale="55000" lnSpcReduction="20000"/>
+            <a:normAutofit fontScale="62500" lnSpcReduction="20000"/>
           </a:bodyPr>
           <a:lstStyle/>
           <a:p>
-            <a:r>
-              <a:rPr lang="nl-NL" dirty="0"/>
-              <a:t>Naam (label)</a:t>
-            </a:r>
-          </a:p>
-          <a:p>
-            <a:r>
-              <a:rPr lang="nl-NL" dirty="0"/>
-              <a:t>Definitie</a:t>
-            </a:r>
-          </a:p>
-          <a:p>
-            <a:r>
-              <a:rPr lang="nl-NL" dirty="0"/>
-              <a:t>Toelichting</a:t>
-            </a:r>
-          </a:p>
-          <a:p>
-            <a:r>
-              <a:rPr lang="nl-NL" dirty="0"/>
-              <a:t>GGM Source GUID</a:t>
-            </a:r>
-          </a:p>
-          <a:p>
-            <a:r>
-              <a:rPr lang="nl-NL" dirty="0"/>
-              <a:t>GGM Target GUID</a:t>
-            </a:r>
-          </a:p>
-          <a:p>
-            <a:r>
-              <a:rPr lang="nl-NL" dirty="0"/>
-              <a:t>GEMMA Source GUID</a:t>
-            </a:r>
-          </a:p>
-          <a:p>
-            <a:r>
-              <a:rPr lang="nl-NL" dirty="0"/>
-              <a:t>GEMMA Target GUID</a:t>
-            </a:r>
-          </a:p>
-          <a:p>
-            <a:r>
-              <a:rPr lang="nl-NL" dirty="0"/>
-              <a:t>UML-type ( Associatie, Generalisatie, </a:t>
-            </a:r>
+            <a:pPr marL="514350" indent="-514350">
+              <a:buFont typeface="+mj-lt"/>
+              <a:buAutoNum type="arabicPeriod"/>
+            </a:pPr>
             <a:r>
               <a:rPr lang="nl-NL" dirty="0" err="1"/>
-              <a:t>Aggretatie</a:t>
-            </a:r>
-            <a:r>
-              <a:rPr lang="nl-NL" dirty="0"/>
-              <a:t>)</a:t>
-            </a:r>
-          </a:p>
-          <a:p>
-            <a:r>
-              <a:rPr lang="nl-NL" dirty="0"/>
-              <a:t>ArchiMate-type (Association, -</a:t>
-            </a:r>
+              <a:t>nr</a:t>
+            </a:r>
+            <a:r>
+              <a:rPr lang="nl-NL" dirty="0"/>
+              <a:t> (technisch nummer</a:t>
+            </a:r>
+            <a:r>
+              <a:rPr lang="nl-NL"/>
+              <a:t>, nodig </a:t>
+            </a:r>
+            <a:r>
+              <a:rPr lang="nl-NL" dirty="0"/>
+              <a:t>voor de uitwisseling, wordt niet opgenomen in de modellen)</a:t>
+            </a:r>
+          </a:p>
+          <a:p>
+            <a:pPr marL="514350" indent="-514350">
+              <a:buFont typeface="+mj-lt"/>
+              <a:buAutoNum type="arabicPeriod"/>
+            </a:pPr>
+            <a:r>
+              <a:rPr lang="nl-NL" dirty="0"/>
+              <a:t>naam (label)</a:t>
+            </a:r>
+          </a:p>
+          <a:p>
+            <a:pPr marL="514350" indent="-514350">
+              <a:buFont typeface="+mj-lt"/>
+              <a:buAutoNum type="arabicPeriod"/>
+            </a:pPr>
+            <a:r>
+              <a:rPr lang="nl-NL" dirty="0"/>
+              <a:t>definitie</a:t>
+            </a:r>
+          </a:p>
+          <a:p>
+            <a:pPr marL="514350" indent="-514350">
+              <a:buFont typeface="+mj-lt"/>
+              <a:buAutoNum type="arabicPeriod"/>
+            </a:pPr>
+            <a:r>
+              <a:rPr lang="nl-NL" dirty="0"/>
+              <a:t>toelichting</a:t>
+            </a:r>
+          </a:p>
+          <a:p>
+            <a:pPr marL="514350" indent="-514350">
+              <a:buFont typeface="+mj-lt"/>
+              <a:buAutoNum type="arabicPeriod"/>
+            </a:pPr>
             <a:r>
               <a:rPr lang="nl-NL" dirty="0" err="1"/>
-              <a:t>Specialization</a:t>
-            </a:r>
-            <a:r>
-              <a:rPr lang="nl-NL" dirty="0"/>
-              <a:t>, </a:t>
+              <a:t>ggm-guid</a:t>
+            </a:r>
+            <a:endParaRPr lang="nl-NL" dirty="0"/>
+          </a:p>
+          <a:p>
+            <a:pPr marL="514350" indent="-514350">
+              <a:buFont typeface="+mj-lt"/>
+              <a:buAutoNum type="arabicPeriod"/>
+            </a:pPr>
+            <a:r>
+              <a:rPr lang="nl-NL" dirty="0" err="1"/>
+              <a:t>ggm</a:t>
+            </a:r>
+            <a:r>
+              <a:rPr lang="nl-NL" dirty="0"/>
+              <a:t>-source-</a:t>
+            </a:r>
+            <a:r>
+              <a:rPr lang="nl-NL" dirty="0" err="1"/>
+              <a:t>guid</a:t>
+            </a:r>
+            <a:endParaRPr lang="nl-NL" dirty="0"/>
+          </a:p>
+          <a:p>
+            <a:pPr marL="514350" indent="-514350">
+              <a:buFont typeface="+mj-lt"/>
+              <a:buAutoNum type="arabicPeriod"/>
+            </a:pPr>
+            <a:r>
+              <a:rPr lang="nl-NL" dirty="0" err="1"/>
+              <a:t>ggm</a:t>
+            </a:r>
+            <a:r>
+              <a:rPr lang="nl-NL" dirty="0"/>
+              <a:t>-target-</a:t>
+            </a:r>
+            <a:r>
+              <a:rPr lang="nl-NL" dirty="0" err="1"/>
+              <a:t>guid</a:t>
+            </a:r>
+            <a:endParaRPr lang="nl-NL" dirty="0"/>
+          </a:p>
+          <a:p>
+            <a:pPr marL="514350" indent="-514350">
+              <a:buFont typeface="+mj-lt"/>
+              <a:buAutoNum type="arabicPeriod"/>
+            </a:pPr>
+            <a:r>
+              <a:rPr lang="nl-NL" dirty="0" err="1"/>
+              <a:t>gemma-guid</a:t>
+            </a:r>
+            <a:endParaRPr lang="nl-NL" dirty="0"/>
+          </a:p>
+          <a:p>
+            <a:pPr marL="514350" indent="-514350">
+              <a:buFont typeface="+mj-lt"/>
+              <a:buAutoNum type="arabicPeriod"/>
+            </a:pPr>
+            <a:r>
+              <a:rPr lang="nl-NL" dirty="0" err="1"/>
+              <a:t>gemma</a:t>
+            </a:r>
+            <a:r>
+              <a:rPr lang="nl-NL" dirty="0"/>
+              <a:t>-source-</a:t>
+            </a:r>
+            <a:r>
+              <a:rPr lang="nl-NL" dirty="0" err="1"/>
+              <a:t>guid</a:t>
+            </a:r>
+            <a:endParaRPr lang="nl-NL" dirty="0"/>
+          </a:p>
+          <a:p>
+            <a:pPr marL="514350" indent="-514350">
+              <a:buFont typeface="+mj-lt"/>
+              <a:buAutoNum type="arabicPeriod"/>
+            </a:pPr>
+            <a:r>
+              <a:rPr lang="nl-NL" dirty="0" err="1"/>
+              <a:t>gemma</a:t>
+            </a:r>
+            <a:r>
+              <a:rPr lang="nl-NL" dirty="0"/>
+              <a:t>-target-</a:t>
+            </a:r>
+            <a:r>
+              <a:rPr lang="nl-NL" dirty="0" err="1"/>
+              <a:t>guid</a:t>
+            </a:r>
+            <a:endParaRPr lang="nl-NL" dirty="0"/>
+          </a:p>
+          <a:p>
+            <a:pPr marL="514350" indent="-514350">
+              <a:buFont typeface="+mj-lt"/>
+              <a:buAutoNum type="arabicPeriod"/>
+            </a:pPr>
+            <a:r>
+              <a:rPr lang="nl-NL" dirty="0" err="1"/>
+              <a:t>uml</a:t>
+            </a:r>
+            <a:r>
+              <a:rPr lang="nl-NL" dirty="0"/>
+              <a:t>-type ( Associatie, Generalisatie, Aggregatie)</a:t>
+            </a:r>
+          </a:p>
+          <a:p>
+            <a:pPr marL="514350" indent="-514350">
+              <a:buFont typeface="+mj-lt"/>
+              <a:buAutoNum type="arabicPeriod"/>
+            </a:pPr>
+            <a:r>
+              <a:rPr lang="nl-NL" dirty="0" err="1"/>
+              <a:t>archimate</a:t>
+            </a:r>
+            <a:r>
+              <a:rPr lang="nl-NL" dirty="0"/>
+              <a:t>-type (Association, Generalisatie, </a:t>
             </a:r>
             <a:r>
               <a:rPr lang="nl-NL" dirty="0" err="1"/>
@@ -4659,38 +4867,25 @@
             </a:r>
           </a:p>
           <a:p>
-            <a:r>
-              <a:rPr lang="nl-NL" dirty="0"/>
-              <a:t>GEMMA GUID</a:t>
-            </a:r>
-          </a:p>
-          <a:p>
-            <a:r>
-              <a:rPr lang="nl-NL" dirty="0"/>
-              <a:t>GGM GUID</a:t>
-            </a:r>
-          </a:p>
-          <a:p>
-            <a:r>
-              <a:rPr lang="nl-NL" dirty="0"/>
-              <a:t>Domein Iv3</a:t>
-            </a:r>
-            <a:r>
-              <a:rPr lang="nl-NL" baseline="30000" dirty="0"/>
-              <a:t>plus </a:t>
-            </a:r>
-          </a:p>
-          <a:p>
-            <a:r>
-              <a:rPr lang="nl-NL" dirty="0"/>
-              <a:t>Domein DCAT</a:t>
-            </a:r>
-          </a:p>
-          <a:p>
-            <a:r>
-              <a:rPr lang="nl-NL" dirty="0"/>
-              <a:t>Domein GEMMA</a:t>
-            </a:r>
+            <a:pPr marL="514350" indent="-514350">
+              <a:buFont typeface="+mj-lt"/>
+              <a:buAutoNum type="arabicPeriod"/>
+            </a:pPr>
+            <a:r>
+              <a:rPr lang="nl-NL" dirty="0"/>
+              <a:t>datum-tijd-export (</a:t>
+            </a:r>
+            <a:r>
+              <a:rPr lang="nl-NL" dirty="0" err="1"/>
+              <a:t>ddmmyyyy-hh:mm:ss</a:t>
+            </a:r>
+            <a:r>
+              <a:rPr lang="nl-NL" dirty="0"/>
+              <a:t>)</a:t>
+            </a:r>
+          </a:p>
+          <a:p>
+            <a:endParaRPr lang="nl-NL" dirty="0"/>
           </a:p>
           <a:p>
             <a:pPr lvl="1"/>

</xml_diff>